<commit_message>
Changes in mapa conceptual
</commit_message>
<xml_diff>
--- a/document/ELASTICSEARCH SPRING DATA04.pptx
+++ b/document/ELASTICSEARCH SPRING DATA04.pptx
@@ -5,7 +5,7 @@
     <p:sldMasterId id="2147483672" r:id="rId1"/>
   </p:sldMasterIdLst>
   <p:handoutMasterIdLst>
-    <p:handoutMasterId r:id="rId14"/>
+    <p:handoutMasterId r:id="rId21"/>
   </p:handoutMasterIdLst>
   <p:sldIdLst>
     <p:sldId id="256" r:id="rId2"/>
@@ -19,7 +19,14 @@
     <p:sldId id="264" r:id="rId10"/>
     <p:sldId id="265" r:id="rId11"/>
     <p:sldId id="267" r:id="rId12"/>
-    <p:sldId id="266" r:id="rId13"/>
+    <p:sldId id="268" r:id="rId13"/>
+    <p:sldId id="269" r:id="rId14"/>
+    <p:sldId id="270" r:id="rId15"/>
+    <p:sldId id="271" r:id="rId16"/>
+    <p:sldId id="272" r:id="rId17"/>
+    <p:sldId id="273" r:id="rId18"/>
+    <p:sldId id="274" r:id="rId19"/>
+    <p:sldId id="266" r:id="rId20"/>
   </p:sldIdLst>
   <p:sldSz cx="9144000" cy="6858000" type="screen4x3"/>
   <p:notesSz cx="6858000" cy="9313863"/>
@@ -203,7 +210,7 @@
           <a:p>
             <a:fld id="{F7DA7D6F-4005-4BDF-A58A-13113FA9B93D}" type="datetimeFigureOut">
               <a:rPr lang="en-US" smtClean="0"/>
-              <a:t>10/9/2017</a:t>
+              <a:t>10/11/2017</a:t>
             </a:fld>
             <a:endParaRPr lang="en-US"/>
           </a:p>
@@ -461,7 +468,7 @@
           <a:p>
             <a:fld id="{1A062593-CC57-4187-A946-F403F5B40C95}" type="datetimeFigureOut">
               <a:rPr lang="en-US" smtClean="0"/>
-              <a:t>10/8/2017</a:t>
+              <a:t>10/11/2017</a:t>
             </a:fld>
             <a:endParaRPr lang="en-US"/>
           </a:p>
@@ -631,7 +638,7 @@
           <a:p>
             <a:fld id="{1A062593-CC57-4187-A946-F403F5B40C95}" type="datetimeFigureOut">
               <a:rPr lang="en-US" smtClean="0"/>
-              <a:t>10/8/2017</a:t>
+              <a:t>10/11/2017</a:t>
             </a:fld>
             <a:endParaRPr lang="en-US"/>
           </a:p>
@@ -806,7 +813,7 @@
           <a:p>
             <a:fld id="{1A062593-CC57-4187-A946-F403F5B40C95}" type="datetimeFigureOut">
               <a:rPr lang="en-US" smtClean="0"/>
-              <a:t>10/8/2017</a:t>
+              <a:t>10/11/2017</a:t>
             </a:fld>
             <a:endParaRPr lang="en-US"/>
           </a:p>
@@ -971,7 +978,7 @@
           <a:p>
             <a:fld id="{1A062593-CC57-4187-A946-F403F5B40C95}" type="datetimeFigureOut">
               <a:rPr lang="en-US" smtClean="0"/>
-              <a:t>10/8/2017</a:t>
+              <a:t>10/11/2017</a:t>
             </a:fld>
             <a:endParaRPr lang="en-US"/>
           </a:p>
@@ -1205,7 +1212,7 @@
           <a:p>
             <a:fld id="{1A062593-CC57-4187-A946-F403F5B40C95}" type="datetimeFigureOut">
               <a:rPr lang="en-US" smtClean="0"/>
-              <a:t>10/8/2017</a:t>
+              <a:t>10/11/2017</a:t>
             </a:fld>
             <a:endParaRPr lang="en-US"/>
           </a:p>
@@ -1501,7 +1508,7 @@
           <a:p>
             <a:fld id="{1A062593-CC57-4187-A946-F403F5B40C95}" type="datetimeFigureOut">
               <a:rPr lang="en-US" smtClean="0"/>
-              <a:t>10/8/2017</a:t>
+              <a:t>10/11/2017</a:t>
             </a:fld>
             <a:endParaRPr lang="en-US"/>
           </a:p>
@@ -1885,7 +1892,7 @@
           <a:p>
             <a:fld id="{1A062593-CC57-4187-A946-F403F5B40C95}" type="datetimeFigureOut">
               <a:rPr lang="en-US" smtClean="0"/>
-              <a:t>10/8/2017</a:t>
+              <a:t>10/11/2017</a:t>
             </a:fld>
             <a:endParaRPr lang="en-US"/>
           </a:p>
@@ -2058,7 +2065,7 @@
           <a:p>
             <a:fld id="{1A062593-CC57-4187-A946-F403F5B40C95}" type="datetimeFigureOut">
               <a:rPr lang="en-US" smtClean="0"/>
-              <a:t>10/8/2017</a:t>
+              <a:t>10/11/2017</a:t>
             </a:fld>
             <a:endParaRPr lang="en-US"/>
           </a:p>
@@ -2148,7 +2155,7 @@
           <a:p>
             <a:fld id="{1A062593-CC57-4187-A946-F403F5B40C95}" type="datetimeFigureOut">
               <a:rPr lang="en-US" smtClean="0"/>
-              <a:t>10/8/2017</a:t>
+              <a:t>10/11/2017</a:t>
             </a:fld>
             <a:endParaRPr lang="en-US"/>
           </a:p>
@@ -2443,7 +2450,7 @@
           <a:p>
             <a:fld id="{1A062593-CC57-4187-A946-F403F5B40C95}" type="datetimeFigureOut">
               <a:rPr lang="en-US" smtClean="0"/>
-              <a:t>10/8/2017</a:t>
+              <a:t>10/11/2017</a:t>
             </a:fld>
             <a:endParaRPr lang="en-US"/>
           </a:p>
@@ -2577,7 +2584,7 @@
           <a:p>
             <a:fld id="{1A062593-CC57-4187-A946-F403F5B40C95}" type="datetimeFigureOut">
               <a:rPr lang="en-US" smtClean="0"/>
-              <a:t>10/8/2017</a:t>
+              <a:t>10/11/2017</a:t>
             </a:fld>
             <a:endParaRPr lang="en-US"/>
           </a:p>
@@ -2880,7 +2887,7 @@
           <a:p>
             <a:fld id="{1A062593-CC57-4187-A946-F403F5B40C95}" type="datetimeFigureOut">
               <a:rPr lang="en-US" smtClean="0"/>
-              <a:t>10/8/2017</a:t>
+              <a:t>10/11/2017</a:t>
             </a:fld>
             <a:endParaRPr lang="en-US"/>
           </a:p>
@@ -3862,6 +3869,870 @@
           <a:lstStyle/>
           <a:p>
             <a:r>
+              <a:rPr lang="en-US" b="1" dirty="0"/>
+              <a:t>¿QUÉ ES UN EDICTO?</a:t>
+            </a:r>
+          </a:p>
+        </p:txBody>
+      </p:sp>
+      <p:sp>
+        <p:nvSpPr>
+          <p:cNvPr id="3" name="2 Marcador de contenido"/>
+          <p:cNvSpPr>
+            <a:spLocks noGrp="1"/>
+          </p:cNvSpPr>
+          <p:nvPr>
+            <p:ph idx="1"/>
+          </p:nvPr>
+        </p:nvSpPr>
+        <p:spPr/>
+        <p:txBody>
+          <a:bodyPr/>
+          <a:lstStyle/>
+          <a:p>
+            <a:pPr marL="0" indent="0">
+              <a:buNone/>
+            </a:pPr>
+            <a:r>
+              <a:rPr lang="en-US" b="1" dirty="0" smtClean="0"/>
+              <a:t>EDICTO</a:t>
+            </a:r>
+          </a:p>
+          <a:p>
+            <a:pPr marL="0" indent="0">
+              <a:buNone/>
+            </a:pPr>
+            <a:endParaRPr lang="en-US" b="1" dirty="0"/>
+          </a:p>
+          <a:p>
+            <a:pPr marL="0" indent="0">
+              <a:buNone/>
+            </a:pPr>
+            <a:r>
+              <a:rPr lang="es-ES" sz="2800" b="1" dirty="0"/>
+              <a:t>Edicto</a:t>
+            </a:r>
+            <a:r>
+              <a:rPr lang="es-ES" sz="2800" dirty="0"/>
+              <a:t> es el </a:t>
+            </a:r>
+            <a:r>
+              <a:rPr lang="es-ES" sz="2800" b="1" dirty="0"/>
+              <a:t>mandato o decreto publicado con autoridad de un magistrado</a:t>
+            </a:r>
+            <a:r>
+              <a:rPr lang="es-ES" sz="2800" dirty="0"/>
+              <a:t>. El concepto procede del latín </a:t>
+            </a:r>
+            <a:r>
+              <a:rPr lang="es-ES" sz="2800" i="1" dirty="0" err="1"/>
+              <a:t>edictum</a:t>
+            </a:r>
+            <a:r>
+              <a:rPr lang="es-ES" sz="2800" dirty="0"/>
+              <a:t>, un vocablo que se utilizaba para nombrar al pronunciamiento de los magistrados romanos sobre cuestiones relativas a su </a:t>
+            </a:r>
+            <a:r>
+              <a:rPr lang="es-ES" sz="2800" b="1" dirty="0"/>
+              <a:t>competencia</a:t>
+            </a:r>
+            <a:r>
+              <a:rPr lang="es-ES" sz="2800" dirty="0"/>
+              <a:t>.</a:t>
+            </a:r>
+            <a:endParaRPr lang="en-US" sz="2800" dirty="0"/>
+          </a:p>
+        </p:txBody>
+      </p:sp>
+    </p:spTree>
+    <p:extLst>
+      <p:ext uri="{BB962C8B-B14F-4D97-AF65-F5344CB8AC3E}">
+        <p14:creationId xmlns:p14="http://schemas.microsoft.com/office/powerpoint/2010/main" val="1247725366"/>
+      </p:ext>
+    </p:extLst>
+  </p:cSld>
+  <p:clrMapOvr>
+    <a:masterClrMapping/>
+  </p:clrMapOvr>
+</p:sld>
+</file>
+
+<file path=ppt/slides/slide13.xml><?xml version="1.0" encoding="utf-8"?>
+<p:sld xmlns:a="http://schemas.openxmlformats.org/drawingml/2006/main" xmlns:r="http://schemas.openxmlformats.org/officeDocument/2006/relationships" xmlns:p="http://schemas.openxmlformats.org/presentationml/2006/main">
+  <p:cSld>
+    <p:spTree>
+      <p:nvGrpSpPr>
+        <p:cNvPr id="1" name=""/>
+        <p:cNvGrpSpPr/>
+        <p:nvPr/>
+      </p:nvGrpSpPr>
+      <p:grpSpPr>
+        <a:xfrm>
+          <a:off x="0" y="0"/>
+          <a:ext cx="0" cy="0"/>
+          <a:chOff x="0" y="0"/>
+          <a:chExt cx="0" cy="0"/>
+        </a:xfrm>
+      </p:grpSpPr>
+      <p:sp>
+        <p:nvSpPr>
+          <p:cNvPr id="2" name="1 Título"/>
+          <p:cNvSpPr>
+            <a:spLocks noGrp="1"/>
+          </p:cNvSpPr>
+          <p:nvPr>
+            <p:ph type="title"/>
+          </p:nvPr>
+        </p:nvSpPr>
+        <p:spPr/>
+        <p:txBody>
+          <a:bodyPr/>
+          <a:lstStyle/>
+          <a:p>
+            <a:r>
+              <a:rPr lang="en-US" b="1" dirty="0"/>
+              <a:t>¿QUÉ ES UN EDICTO?</a:t>
+            </a:r>
+            <a:endParaRPr lang="en-US" dirty="0"/>
+          </a:p>
+        </p:txBody>
+      </p:sp>
+      <p:sp>
+        <p:nvSpPr>
+          <p:cNvPr id="3" name="2 Marcador de contenido"/>
+          <p:cNvSpPr>
+            <a:spLocks noGrp="1"/>
+          </p:cNvSpPr>
+          <p:nvPr>
+            <p:ph idx="1"/>
+          </p:nvPr>
+        </p:nvSpPr>
+        <p:spPr/>
+        <p:txBody>
+          <a:bodyPr>
+            <a:normAutofit/>
+          </a:bodyPr>
+          <a:lstStyle/>
+          <a:p>
+            <a:pPr marL="0" indent="0">
+              <a:buNone/>
+            </a:pPr>
+            <a:r>
+              <a:rPr lang="es-ES" sz="2800" dirty="0"/>
+              <a:t>Documento mediante el cual se da a conocer un mandato expedido por autoridad jurídica competente. Contiene una notificación,  citatorio o emplazamiento. Es obligatoria su publicación en periódicos de mayor circulación, Diario Oficial de la Federación o Gacetas de los Gobiernos Estatales o Municipales.</a:t>
+            </a:r>
+            <a:endParaRPr lang="en-US" sz="2800" dirty="0"/>
+          </a:p>
+        </p:txBody>
+      </p:sp>
+    </p:spTree>
+    <p:extLst>
+      <p:ext uri="{BB962C8B-B14F-4D97-AF65-F5344CB8AC3E}">
+        <p14:creationId xmlns:p14="http://schemas.microsoft.com/office/powerpoint/2010/main" val="2482341259"/>
+      </p:ext>
+    </p:extLst>
+  </p:cSld>
+  <p:clrMapOvr>
+    <a:masterClrMapping/>
+  </p:clrMapOvr>
+</p:sld>
+</file>
+
+<file path=ppt/slides/slide14.xml><?xml version="1.0" encoding="utf-8"?>
+<p:sld xmlns:a="http://schemas.openxmlformats.org/drawingml/2006/main" xmlns:r="http://schemas.openxmlformats.org/officeDocument/2006/relationships" xmlns:p="http://schemas.openxmlformats.org/presentationml/2006/main">
+  <p:cSld>
+    <p:spTree>
+      <p:nvGrpSpPr>
+        <p:cNvPr id="1" name=""/>
+        <p:cNvGrpSpPr/>
+        <p:nvPr/>
+      </p:nvGrpSpPr>
+      <p:grpSpPr>
+        <a:xfrm>
+          <a:off x="0" y="0"/>
+          <a:ext cx="0" cy="0"/>
+          <a:chOff x="0" y="0"/>
+          <a:chExt cx="0" cy="0"/>
+        </a:xfrm>
+      </p:grpSpPr>
+      <p:sp>
+        <p:nvSpPr>
+          <p:cNvPr id="2" name="1 Título"/>
+          <p:cNvSpPr>
+            <a:spLocks noGrp="1"/>
+          </p:cNvSpPr>
+          <p:nvPr>
+            <p:ph type="title"/>
+          </p:nvPr>
+        </p:nvSpPr>
+        <p:spPr/>
+        <p:txBody>
+          <a:bodyPr/>
+          <a:lstStyle/>
+          <a:p>
+            <a:r>
+              <a:rPr lang="en-US" b="1" dirty="0" smtClean="0"/>
+              <a:t>CUAL ES LA MISION DE UN EDICTO</a:t>
+            </a:r>
+            <a:endParaRPr lang="en-US" dirty="0"/>
+          </a:p>
+        </p:txBody>
+      </p:sp>
+      <p:pic>
+        <p:nvPicPr>
+          <p:cNvPr id="4" name="3 Marcador de contenido"/>
+          <p:cNvPicPr>
+            <a:picLocks noGrp="1" noChangeAspect="1"/>
+          </p:cNvPicPr>
+          <p:nvPr>
+            <p:ph idx="1"/>
+          </p:nvPr>
+        </p:nvPicPr>
+        <p:blipFill>
+          <a:blip r:embed="rId2" cstate="print">
+            <a:extLst>
+              <a:ext uri="{28A0092B-C50C-407E-A947-70E740481C1C}">
+                <a14:useLocalDpi xmlns:a14="http://schemas.microsoft.com/office/drawing/2010/main" val="0"/>
+              </a:ext>
+            </a:extLst>
+          </a:blip>
+          <a:stretch>
+            <a:fillRect/>
+          </a:stretch>
+        </p:blipFill>
+        <p:spPr>
+          <a:xfrm>
+            <a:off x="2895600" y="1371600"/>
+            <a:ext cx="1987549" cy="2484437"/>
+          </a:xfrm>
+        </p:spPr>
+      </p:pic>
+      <p:sp>
+        <p:nvSpPr>
+          <p:cNvPr id="5" name="4 Rectángulo"/>
+          <p:cNvSpPr/>
+          <p:nvPr/>
+        </p:nvSpPr>
+        <p:spPr>
+          <a:xfrm>
+            <a:off x="304800" y="4306163"/>
+            <a:ext cx="8610600" cy="2246769"/>
+          </a:xfrm>
+          <a:prstGeom prst="rect">
+            <a:avLst/>
+          </a:prstGeom>
+        </p:spPr>
+        <p:txBody>
+          <a:bodyPr wrap="square">
+            <a:spAutoFit/>
+          </a:bodyPr>
+          <a:lstStyle/>
+          <a:p>
+            <a:r>
+              <a:rPr lang="es-ES" sz="2800" dirty="0"/>
+              <a:t>La misión de un edicto es hacer público algo. Por ejemplo, si alguien desea cambiar de nombre, el juez ordenará dar a conocer el hecho, es también una manera de formalizar alguna acción frente a la sociedad.</a:t>
+            </a:r>
+            <a:endParaRPr lang="en-US" sz="2800" dirty="0"/>
+          </a:p>
+        </p:txBody>
+      </p:sp>
+    </p:spTree>
+    <p:extLst>
+      <p:ext uri="{BB962C8B-B14F-4D97-AF65-F5344CB8AC3E}">
+        <p14:creationId xmlns:p14="http://schemas.microsoft.com/office/powerpoint/2010/main" val="466596933"/>
+      </p:ext>
+    </p:extLst>
+  </p:cSld>
+  <p:clrMapOvr>
+    <a:masterClrMapping/>
+  </p:clrMapOvr>
+</p:sld>
+</file>
+
+<file path=ppt/slides/slide15.xml><?xml version="1.0" encoding="utf-8"?>
+<p:sld xmlns:a="http://schemas.openxmlformats.org/drawingml/2006/main" xmlns:r="http://schemas.openxmlformats.org/officeDocument/2006/relationships" xmlns:p="http://schemas.openxmlformats.org/presentationml/2006/main">
+  <p:cSld>
+    <p:spTree>
+      <p:nvGrpSpPr>
+        <p:cNvPr id="1" name=""/>
+        <p:cNvGrpSpPr/>
+        <p:nvPr/>
+      </p:nvGrpSpPr>
+      <p:grpSpPr>
+        <a:xfrm>
+          <a:off x="0" y="0"/>
+          <a:ext cx="0" cy="0"/>
+          <a:chOff x="0" y="0"/>
+          <a:chExt cx="0" cy="0"/>
+        </a:xfrm>
+      </p:grpSpPr>
+      <p:sp>
+        <p:nvSpPr>
+          <p:cNvPr id="2" name="1 Título"/>
+          <p:cNvSpPr>
+            <a:spLocks noGrp="1"/>
+          </p:cNvSpPr>
+          <p:nvPr>
+            <p:ph type="title"/>
+          </p:nvPr>
+        </p:nvSpPr>
+        <p:spPr/>
+        <p:txBody>
+          <a:bodyPr>
+            <a:normAutofit fontScale="90000"/>
+          </a:bodyPr>
+          <a:lstStyle/>
+          <a:p>
+            <a:r>
+              <a:rPr lang="es-ES" b="1" dirty="0"/>
+              <a:t>¿CUANDO PROCEDE LA NOTIFICACIÓN POR EDICTOS?</a:t>
+            </a:r>
+            <a:endParaRPr lang="en-US" dirty="0"/>
+          </a:p>
+        </p:txBody>
+      </p:sp>
+      <p:sp>
+        <p:nvSpPr>
+          <p:cNvPr id="3" name="2 Marcador de contenido"/>
+          <p:cNvSpPr>
+            <a:spLocks noGrp="1"/>
+          </p:cNvSpPr>
+          <p:nvPr>
+            <p:ph idx="1"/>
+          </p:nvPr>
+        </p:nvSpPr>
+        <p:spPr/>
+        <p:txBody>
+          <a:bodyPr>
+            <a:normAutofit/>
+          </a:bodyPr>
+          <a:lstStyle/>
+          <a:p>
+            <a:pPr marL="0" indent="0">
+              <a:buNone/>
+            </a:pPr>
+            <a:endParaRPr lang="es-ES" sz="2400" dirty="0" smtClean="0"/>
+          </a:p>
+          <a:p>
+            <a:pPr marL="0" indent="0">
+              <a:buNone/>
+            </a:pPr>
+            <a:r>
+              <a:rPr lang="es-ES" sz="2400" dirty="0" smtClean="0"/>
+              <a:t>L</a:t>
+            </a:r>
+            <a:r>
+              <a:rPr lang="es-ES" sz="2400" b="1" dirty="0" smtClean="0"/>
+              <a:t>a </a:t>
+            </a:r>
+            <a:r>
+              <a:rPr lang="es-ES" sz="2400" b="1" dirty="0"/>
+              <a:t>Citación</a:t>
+            </a:r>
+            <a:r>
+              <a:rPr lang="es-ES" sz="2400" dirty="0"/>
+              <a:t> es un </a:t>
+            </a:r>
+            <a:r>
+              <a:rPr lang="es-ES" sz="2400" i="1" dirty="0"/>
+              <a:t>acto por en cual un juez o tribunal </a:t>
+            </a:r>
+            <a:r>
+              <a:rPr lang="es-ES" sz="2400" b="1" i="1" dirty="0"/>
+              <a:t>ordena la comparecencia </a:t>
+            </a:r>
+            <a:r>
+              <a:rPr lang="es-ES" sz="2400" i="1" dirty="0"/>
+              <a:t>de una persona: sea parte, testigo, perito o cualquier otro tercero, para realizar o presenciar una diligencia que afecte a un proceso judicial.</a:t>
+            </a:r>
+            <a:endParaRPr lang="en-US" sz="2400" dirty="0"/>
+          </a:p>
+        </p:txBody>
+      </p:sp>
+    </p:spTree>
+    <p:extLst>
+      <p:ext uri="{BB962C8B-B14F-4D97-AF65-F5344CB8AC3E}">
+        <p14:creationId xmlns:p14="http://schemas.microsoft.com/office/powerpoint/2010/main" val="1620092047"/>
+      </p:ext>
+    </p:extLst>
+  </p:cSld>
+  <p:clrMapOvr>
+    <a:masterClrMapping/>
+  </p:clrMapOvr>
+</p:sld>
+</file>
+
+<file path=ppt/slides/slide16.xml><?xml version="1.0" encoding="utf-8"?>
+<p:sld xmlns:a="http://schemas.openxmlformats.org/drawingml/2006/main" xmlns:r="http://schemas.openxmlformats.org/officeDocument/2006/relationships" xmlns:p="http://schemas.openxmlformats.org/presentationml/2006/main">
+  <p:cSld>
+    <p:spTree>
+      <p:nvGrpSpPr>
+        <p:cNvPr id="1" name=""/>
+        <p:cNvGrpSpPr/>
+        <p:nvPr/>
+      </p:nvGrpSpPr>
+      <p:grpSpPr>
+        <a:xfrm>
+          <a:off x="0" y="0"/>
+          <a:ext cx="0" cy="0"/>
+          <a:chOff x="0" y="0"/>
+          <a:chExt cx="0" cy="0"/>
+        </a:xfrm>
+      </p:grpSpPr>
+      <p:sp>
+        <p:nvSpPr>
+          <p:cNvPr id="2" name="1 Título"/>
+          <p:cNvSpPr>
+            <a:spLocks noGrp="1"/>
+          </p:cNvSpPr>
+          <p:nvPr>
+            <p:ph type="title"/>
+          </p:nvPr>
+        </p:nvSpPr>
+        <p:spPr/>
+        <p:txBody>
+          <a:bodyPr>
+            <a:normAutofit fontScale="90000"/>
+          </a:bodyPr>
+          <a:lstStyle/>
+          <a:p>
+            <a:r>
+              <a:rPr lang="en-US" dirty="0" err="1" smtClean="0"/>
+              <a:t>Anormalidades</a:t>
+            </a:r>
+            <a:r>
+              <a:rPr lang="en-US" dirty="0" smtClean="0"/>
+              <a:t> en la </a:t>
+            </a:r>
+            <a:r>
+              <a:rPr lang="en-US" dirty="0" err="1" smtClean="0"/>
+              <a:t>practica</a:t>
+            </a:r>
+            <a:r>
+              <a:rPr lang="en-US" dirty="0" smtClean="0"/>
+              <a:t> de la </a:t>
+            </a:r>
+            <a:r>
+              <a:rPr lang="en-US" dirty="0" err="1" smtClean="0"/>
+              <a:t>citacion</a:t>
+            </a:r>
+            <a:r>
+              <a:rPr lang="en-US" dirty="0" smtClean="0"/>
+              <a:t> de </a:t>
+            </a:r>
+            <a:r>
+              <a:rPr lang="en-US" dirty="0" err="1" smtClean="0"/>
+              <a:t>edictos</a:t>
+            </a:r>
+            <a:endParaRPr lang="en-US" dirty="0"/>
+          </a:p>
+        </p:txBody>
+      </p:sp>
+      <p:sp>
+        <p:nvSpPr>
+          <p:cNvPr id="3" name="2 Marcador de contenido"/>
+          <p:cNvSpPr>
+            <a:spLocks noGrp="1"/>
+          </p:cNvSpPr>
+          <p:nvPr>
+            <p:ph idx="1"/>
+          </p:nvPr>
+        </p:nvSpPr>
+        <p:spPr/>
+        <p:txBody>
+          <a:bodyPr>
+            <a:normAutofit fontScale="70000" lnSpcReduction="20000"/>
+          </a:bodyPr>
+          <a:lstStyle/>
+          <a:p>
+            <a:endParaRPr lang="es-ES" dirty="0" smtClean="0"/>
+          </a:p>
+          <a:p>
+            <a:r>
+              <a:rPr lang="es-ES" dirty="0" smtClean="0"/>
+              <a:t>Los edictos no son numerados de 1 al 3 en su publicación por lo cual el demandado no sabe si es el primero o el último, porque sólo tiene 30 días desde la primera publicación para contestar </a:t>
+            </a:r>
+          </a:p>
+          <a:p>
+            <a:r>
+              <a:rPr lang="es-ES" dirty="0" smtClean="0"/>
+              <a:t>En la publicación, el actor DEBE enumerarlas, por ejemplo, "PRIMER EDICTO". Posteriormente dentro de 5 días, publicara el mismo edicto, pero con la cabecera de "SEGUNDO EDICTO", etc. Y en 5 días más: "TERCER EDICTO". Se debe publicar tres veces a intervalos de 5 días. </a:t>
+            </a:r>
+          </a:p>
+          <a:p>
+            <a:r>
+              <a:rPr lang="es-ES" dirty="0" smtClean="0"/>
+              <a:t>En </a:t>
+            </a:r>
+            <a:r>
+              <a:rPr lang="es-ES" dirty="0"/>
+              <a:t>la publicación del edicto no se hace una síntesis de la demanda </a:t>
+            </a:r>
+            <a:r>
+              <a:rPr lang="es-ES" dirty="0" smtClean="0"/>
+              <a:t>por </a:t>
+            </a:r>
+            <a:r>
+              <a:rPr lang="es-ES" dirty="0"/>
+              <a:t>el contrario de transcribe todo el documento, gravando la economía del actor y violando de esta manera el Principio de Gratuidad.</a:t>
+            </a:r>
+            <a:endParaRPr lang="en-US" dirty="0"/>
+          </a:p>
+        </p:txBody>
+      </p:sp>
+    </p:spTree>
+    <p:extLst>
+      <p:ext uri="{BB962C8B-B14F-4D97-AF65-F5344CB8AC3E}">
+        <p14:creationId xmlns:p14="http://schemas.microsoft.com/office/powerpoint/2010/main" val="1855521583"/>
+      </p:ext>
+    </p:extLst>
+  </p:cSld>
+  <p:clrMapOvr>
+    <a:masterClrMapping/>
+  </p:clrMapOvr>
+</p:sld>
+</file>
+
+<file path=ppt/slides/slide17.xml><?xml version="1.0" encoding="utf-8"?>
+<p:sld xmlns:a="http://schemas.openxmlformats.org/drawingml/2006/main" xmlns:r="http://schemas.openxmlformats.org/officeDocument/2006/relationships" xmlns:p="http://schemas.openxmlformats.org/presentationml/2006/main">
+  <p:cSld>
+    <p:spTree>
+      <p:nvGrpSpPr>
+        <p:cNvPr id="1" name=""/>
+        <p:cNvGrpSpPr/>
+        <p:nvPr/>
+      </p:nvGrpSpPr>
+      <p:grpSpPr>
+        <a:xfrm>
+          <a:off x="0" y="0"/>
+          <a:ext cx="0" cy="0"/>
+          <a:chOff x="0" y="0"/>
+          <a:chExt cx="0" cy="0"/>
+        </a:xfrm>
+      </p:grpSpPr>
+      <p:sp>
+        <p:nvSpPr>
+          <p:cNvPr id="2" name="1 Título"/>
+          <p:cNvSpPr>
+            <a:spLocks noGrp="1"/>
+          </p:cNvSpPr>
+          <p:nvPr>
+            <p:ph type="title"/>
+          </p:nvPr>
+        </p:nvSpPr>
+        <p:spPr/>
+        <p:txBody>
+          <a:bodyPr>
+            <a:normAutofit fontScale="90000"/>
+          </a:bodyPr>
+          <a:lstStyle/>
+          <a:p>
+            <a:r>
+              <a:rPr lang="en-US" dirty="0" err="1" smtClean="0"/>
+              <a:t>Anormalidades</a:t>
+            </a:r>
+            <a:r>
+              <a:rPr lang="en-US" dirty="0" smtClean="0"/>
+              <a:t> en la </a:t>
+            </a:r>
+            <a:r>
+              <a:rPr lang="en-US" dirty="0" err="1" smtClean="0"/>
+              <a:t>practica</a:t>
+            </a:r>
+            <a:r>
+              <a:rPr lang="en-US" dirty="0" smtClean="0"/>
+              <a:t> de la </a:t>
+            </a:r>
+            <a:r>
+              <a:rPr lang="en-US" dirty="0" err="1" smtClean="0"/>
+              <a:t>citacion</a:t>
+            </a:r>
+            <a:r>
+              <a:rPr lang="en-US" dirty="0" smtClean="0"/>
+              <a:t> de </a:t>
+            </a:r>
+            <a:r>
+              <a:rPr lang="en-US" dirty="0" err="1" smtClean="0"/>
+              <a:t>edictos</a:t>
+            </a:r>
+            <a:endParaRPr lang="en-US" dirty="0"/>
+          </a:p>
+        </p:txBody>
+      </p:sp>
+      <p:sp>
+        <p:nvSpPr>
+          <p:cNvPr id="3" name="2 Marcador de contenido"/>
+          <p:cNvSpPr>
+            <a:spLocks noGrp="1"/>
+          </p:cNvSpPr>
+          <p:nvPr>
+            <p:ph idx="1"/>
+          </p:nvPr>
+        </p:nvSpPr>
+        <p:spPr/>
+        <p:txBody>
+          <a:bodyPr>
+            <a:normAutofit fontScale="70000" lnSpcReduction="20000"/>
+          </a:bodyPr>
+          <a:lstStyle/>
+          <a:p>
+            <a:endParaRPr lang="es-ES" dirty="0" smtClean="0"/>
+          </a:p>
+          <a:p>
+            <a:r>
+              <a:rPr lang="es-ES" dirty="0"/>
+              <a:t>En la demanda no se hace notar que el demandado esta en territorio boliviano, ya que si estuviere en el extranjero nunca se enterará que esta siendo demandado. Porque para demandar a una persona que esta en el extranjero se la hace a través de </a:t>
+            </a:r>
+            <a:r>
+              <a:rPr lang="es-ES" dirty="0" smtClean="0"/>
+              <a:t>un</a:t>
+            </a:r>
+          </a:p>
+          <a:p>
+            <a:r>
+              <a:rPr lang="es-ES" dirty="0" smtClean="0"/>
+              <a:t>En </a:t>
+            </a:r>
+            <a:r>
+              <a:rPr lang="es-ES" dirty="0"/>
+              <a:t>caso de no presentarse el demandado en 30 días, el tribunal le nombra un defensor de oficio o </a:t>
+            </a:r>
+            <a:r>
+              <a:rPr lang="es-ES" dirty="0" err="1"/>
+              <a:t>patrocinante</a:t>
+            </a:r>
+            <a:r>
+              <a:rPr lang="es-ES" dirty="0"/>
+              <a:t> judicial que debe ubicar el paradero del demandado </a:t>
+            </a:r>
+            <a:r>
+              <a:rPr lang="es-ES" dirty="0" smtClean="0"/>
+              <a:t>No </a:t>
+            </a:r>
+            <a:r>
+              <a:rPr lang="es-ES" dirty="0"/>
+              <a:t>le nombra un “representante” judicial, sino solo es un </a:t>
+            </a:r>
+            <a:r>
+              <a:rPr lang="es-ES" dirty="0" err="1"/>
+              <a:t>patrocinante</a:t>
+            </a:r>
+            <a:r>
+              <a:rPr lang="es-ES" dirty="0"/>
+              <a:t>. Un abogado defensor pagado por el Estado es eso: un </a:t>
+            </a:r>
+            <a:r>
+              <a:rPr lang="es-ES" dirty="0" err="1"/>
+              <a:t>patrocinante</a:t>
+            </a:r>
+            <a:r>
+              <a:rPr lang="es-ES" dirty="0"/>
+              <a:t>. Ubicar el paradero del demandado también se le hace imposible al abogado pagado por el Estado, ya que ni siquiera el actor lo sabe, entonces. ¿Cómo lo va saber el </a:t>
+            </a:r>
+            <a:r>
+              <a:rPr lang="es-ES" dirty="0" err="1"/>
+              <a:t>patrocinante</a:t>
+            </a:r>
+            <a:r>
+              <a:rPr lang="es-ES" dirty="0"/>
+              <a:t> judicial? Con esto se lleva a mentir al abogado de oficio cuando responde negativamente en el memorial diciendo: “Que se ha hecho todo lo posible para ubicar el paradero del demandado”.</a:t>
+            </a:r>
+            <a:endParaRPr lang="en-US" dirty="0"/>
+          </a:p>
+        </p:txBody>
+      </p:sp>
+    </p:spTree>
+    <p:extLst>
+      <p:ext uri="{BB962C8B-B14F-4D97-AF65-F5344CB8AC3E}">
+        <p14:creationId xmlns:p14="http://schemas.microsoft.com/office/powerpoint/2010/main" val="1358103719"/>
+      </p:ext>
+    </p:extLst>
+  </p:cSld>
+  <p:clrMapOvr>
+    <a:masterClrMapping/>
+  </p:clrMapOvr>
+</p:sld>
+</file>
+
+<file path=ppt/slides/slide18.xml><?xml version="1.0" encoding="utf-8"?>
+<p:sld xmlns:a="http://schemas.openxmlformats.org/drawingml/2006/main" xmlns:r="http://schemas.openxmlformats.org/officeDocument/2006/relationships" xmlns:p="http://schemas.openxmlformats.org/presentationml/2006/main">
+  <p:cSld>
+    <p:spTree>
+      <p:nvGrpSpPr>
+        <p:cNvPr id="1" name=""/>
+        <p:cNvGrpSpPr/>
+        <p:nvPr/>
+      </p:nvGrpSpPr>
+      <p:grpSpPr>
+        <a:xfrm>
+          <a:off x="0" y="0"/>
+          <a:ext cx="0" cy="0"/>
+          <a:chOff x="0" y="0"/>
+          <a:chExt cx="0" cy="0"/>
+        </a:xfrm>
+      </p:grpSpPr>
+      <p:sp>
+        <p:nvSpPr>
+          <p:cNvPr id="2" name="1 Título"/>
+          <p:cNvSpPr>
+            <a:spLocks noGrp="1"/>
+          </p:cNvSpPr>
+          <p:nvPr>
+            <p:ph type="title"/>
+          </p:nvPr>
+        </p:nvSpPr>
+        <p:spPr/>
+        <p:txBody>
+          <a:bodyPr>
+            <a:normAutofit fontScale="90000"/>
+          </a:bodyPr>
+          <a:lstStyle/>
+          <a:p>
+            <a:r>
+              <a:rPr lang="en-US" dirty="0" err="1"/>
+              <a:t>Anormalidades</a:t>
+            </a:r>
+            <a:r>
+              <a:rPr lang="en-US" dirty="0"/>
+              <a:t> en la </a:t>
+            </a:r>
+            <a:r>
+              <a:rPr lang="en-US" dirty="0" err="1"/>
+              <a:t>practica</a:t>
+            </a:r>
+            <a:r>
+              <a:rPr lang="en-US" dirty="0"/>
+              <a:t> de la </a:t>
+            </a:r>
+            <a:r>
+              <a:rPr lang="en-US" dirty="0" err="1"/>
+              <a:t>citacion</a:t>
+            </a:r>
+            <a:r>
+              <a:rPr lang="en-US" dirty="0"/>
+              <a:t> de </a:t>
+            </a:r>
+            <a:r>
+              <a:rPr lang="en-US" dirty="0" err="1"/>
+              <a:t>edictos</a:t>
+            </a:r>
+            <a:endParaRPr lang="en-US" dirty="0"/>
+          </a:p>
+        </p:txBody>
+      </p:sp>
+      <p:sp>
+        <p:nvSpPr>
+          <p:cNvPr id="3" name="2 Marcador de contenido"/>
+          <p:cNvSpPr>
+            <a:spLocks noGrp="1"/>
+          </p:cNvSpPr>
+          <p:nvPr>
+            <p:ph idx="1"/>
+          </p:nvPr>
+        </p:nvSpPr>
+        <p:spPr/>
+        <p:txBody>
+          <a:bodyPr>
+            <a:normAutofit fontScale="70000" lnSpcReduction="20000"/>
+          </a:bodyPr>
+          <a:lstStyle/>
+          <a:p>
+            <a:r>
+              <a:rPr lang="es-ES" dirty="0"/>
+              <a:t>En materia civil no se le puede declarar rebelde al demandado no habido. Ya que en todo caso el juez le nombra un defensor de oficio, que en el fondo significa que el demandado sé esta defendiendo a través un defensor de oficio. </a:t>
+            </a:r>
+            <a:endParaRPr lang="es-ES" dirty="0" smtClean="0"/>
+          </a:p>
+          <a:p>
+            <a:r>
+              <a:rPr lang="es-ES" dirty="0" smtClean="0"/>
+              <a:t>Al </a:t>
+            </a:r>
+            <a:r>
+              <a:rPr lang="es-ES" dirty="0"/>
+              <a:t>citado con domicilio conocido, puede declarárselo rebelde (CPC, 68), pero al citado con domicilio desconocido (citado por edicto) no se le declara rebelde, se le nombra un defensor de oficio (representante judicial: </a:t>
+            </a:r>
+            <a:r>
+              <a:rPr lang="es-ES" dirty="0" smtClean="0"/>
+              <a:t>que </a:t>
+            </a:r>
+            <a:r>
+              <a:rPr lang="es-ES" dirty="0"/>
+              <a:t>el Código llama equivocadamente “representante” judicial, se le debe llamar solo </a:t>
+            </a:r>
+            <a:r>
+              <a:rPr lang="es-ES" dirty="0" err="1"/>
+              <a:t>patrocinante</a:t>
+            </a:r>
+            <a:r>
+              <a:rPr lang="es-ES" dirty="0"/>
+              <a:t> judicial o abogado defensor pagado por el Estado, o lo comúnmente conocido, Defensor de oficio. </a:t>
+            </a:r>
+            <a:endParaRPr lang="es-ES" dirty="0" smtClean="0"/>
+          </a:p>
+          <a:p>
+            <a:r>
+              <a:rPr lang="es-ES" dirty="0" smtClean="0"/>
+              <a:t>Además </a:t>
+            </a:r>
+            <a:r>
+              <a:rPr lang="es-ES" dirty="0"/>
+              <a:t>el Art.- 131 del CPC debe decir: “El citado con domicilio conocido tendrá obligación de comparecer... bajo conminatoria de ser declarado rebelde”, para que no se contradiga con las Disposiciones De La </a:t>
+            </a:r>
+            <a:r>
+              <a:rPr lang="es-ES" dirty="0" smtClean="0"/>
+              <a:t>Citación</a:t>
+            </a:r>
+            <a:endParaRPr lang="en-US" dirty="0"/>
+          </a:p>
+        </p:txBody>
+      </p:sp>
+    </p:spTree>
+    <p:extLst>
+      <p:ext uri="{BB962C8B-B14F-4D97-AF65-F5344CB8AC3E}">
+        <p14:creationId xmlns:p14="http://schemas.microsoft.com/office/powerpoint/2010/main" val="1992610512"/>
+      </p:ext>
+    </p:extLst>
+  </p:cSld>
+  <p:clrMapOvr>
+    <a:masterClrMapping/>
+  </p:clrMapOvr>
+</p:sld>
+</file>
+
+<file path=ppt/slides/slide19.xml><?xml version="1.0" encoding="utf-8"?>
+<p:sld xmlns:a="http://schemas.openxmlformats.org/drawingml/2006/main" xmlns:r="http://schemas.openxmlformats.org/officeDocument/2006/relationships" xmlns:p="http://schemas.openxmlformats.org/presentationml/2006/main">
+  <p:cSld>
+    <p:spTree>
+      <p:nvGrpSpPr>
+        <p:cNvPr id="1" name=""/>
+        <p:cNvGrpSpPr/>
+        <p:nvPr/>
+      </p:nvGrpSpPr>
+      <p:grpSpPr>
+        <a:xfrm>
+          <a:off x="0" y="0"/>
+          <a:ext cx="0" cy="0"/>
+          <a:chOff x="0" y="0"/>
+          <a:chExt cx="0" cy="0"/>
+        </a:xfrm>
+      </p:grpSpPr>
+      <p:sp>
+        <p:nvSpPr>
+          <p:cNvPr id="2" name="1 Título"/>
+          <p:cNvSpPr>
+            <a:spLocks noGrp="1"/>
+          </p:cNvSpPr>
+          <p:nvPr>
+            <p:ph type="title"/>
+          </p:nvPr>
+        </p:nvSpPr>
+        <p:spPr/>
+        <p:txBody>
+          <a:bodyPr/>
+          <a:lstStyle/>
+          <a:p>
+            <a:r>
               <a:rPr lang="en-US" dirty="0" smtClean="0"/>
               <a:t>REFERENCIAS</a:t>
             </a:r>
@@ -3882,7 +4753,7 @@
         <p:spPr/>
         <p:txBody>
           <a:bodyPr>
-            <a:normAutofit fontScale="77500" lnSpcReduction="20000"/>
+            <a:normAutofit fontScale="70000" lnSpcReduction="20000"/>
           </a:bodyPr>
           <a:lstStyle/>
           <a:p>
@@ -4023,6 +4894,48 @@
               </a:rPr>
               <a:t>github.com/spring-projects/spring-data-elasticsearch</a:t>
             </a:r>
+            <a:endParaRPr lang="en-US" dirty="0" smtClean="0"/>
+          </a:p>
+          <a:p>
+            <a:r>
+              <a:rPr lang="es-ES" dirty="0" err="1"/>
+              <a:t>Ermo</a:t>
+            </a:r>
+            <a:r>
+              <a:rPr lang="es-ES" dirty="0"/>
+              <a:t> </a:t>
+            </a:r>
+            <a:r>
+              <a:rPr lang="es-ES" dirty="0" err="1"/>
+              <a:t>Quisbert</a:t>
+            </a:r>
+            <a:r>
+              <a:rPr lang="es-ES" dirty="0"/>
+              <a:t>. (2017). La Citación. 01 Agosto, 2017, de Apuntes </a:t>
+            </a:r>
+            <a:r>
+              <a:rPr lang="es-ES" dirty="0" err="1"/>
+              <a:t>Juridicos</a:t>
+            </a:r>
+            <a:r>
+              <a:rPr lang="es-ES" dirty="0"/>
+              <a:t> Sitio web: </a:t>
+            </a:r>
+            <a:r>
+              <a:rPr lang="es-ES" dirty="0">
+                <a:hlinkClick r:id="rId6"/>
+              </a:rPr>
+              <a:t>https://</a:t>
+            </a:r>
+            <a:r>
+              <a:rPr lang="es-ES" dirty="0" smtClean="0">
+                <a:hlinkClick r:id="rId6"/>
+              </a:rPr>
+              <a:t>jorgemachicado.blogspot.com/2009/11/dpc17.html</a:t>
+            </a:r>
+            <a:endParaRPr lang="es-ES" dirty="0" smtClean="0"/>
+          </a:p>
+          <a:p>
             <a:endParaRPr lang="en-US" dirty="0" smtClean="0"/>
           </a:p>
           <a:p>

</xml_diff>